<commit_message>
READ ME - UPDATE
</commit_message>
<xml_diff>
--- a/etc/Architecture.pptx
+++ b/etc/Architecture.pptx
@@ -259,7 +259,7 @@
           <a:p>
             <a:fld id="{017808B4-D521-3945-B0F8-A2E44469D97F}" type="datetimeFigureOut">
               <a:rPr kumimoji="1" lang="ko-KR" altLang="en-US" smtClean="0"/>
-              <a:t>2024. 3. 19.</a:t>
+              <a:t>2024. 5. 29.</a:t>
             </a:fld>
             <a:endParaRPr kumimoji="1" lang="ko-KR" altLang="en-US"/>
           </a:p>
@@ -457,7 +457,7 @@
           <a:p>
             <a:fld id="{017808B4-D521-3945-B0F8-A2E44469D97F}" type="datetimeFigureOut">
               <a:rPr kumimoji="1" lang="ko-KR" altLang="en-US" smtClean="0"/>
-              <a:t>2024. 3. 19.</a:t>
+              <a:t>2024. 5. 29.</a:t>
             </a:fld>
             <a:endParaRPr kumimoji="1" lang="ko-KR" altLang="en-US"/>
           </a:p>
@@ -665,7 +665,7 @@
           <a:p>
             <a:fld id="{017808B4-D521-3945-B0F8-A2E44469D97F}" type="datetimeFigureOut">
               <a:rPr kumimoji="1" lang="ko-KR" altLang="en-US" smtClean="0"/>
-              <a:t>2024. 3. 19.</a:t>
+              <a:t>2024. 5. 29.</a:t>
             </a:fld>
             <a:endParaRPr kumimoji="1" lang="ko-KR" altLang="en-US"/>
           </a:p>
@@ -863,7 +863,7 @@
           <a:p>
             <a:fld id="{017808B4-D521-3945-B0F8-A2E44469D97F}" type="datetimeFigureOut">
               <a:rPr kumimoji="1" lang="ko-KR" altLang="en-US" smtClean="0"/>
-              <a:t>2024. 3. 19.</a:t>
+              <a:t>2024. 5. 29.</a:t>
             </a:fld>
             <a:endParaRPr kumimoji="1" lang="ko-KR" altLang="en-US"/>
           </a:p>
@@ -1138,7 +1138,7 @@
           <a:p>
             <a:fld id="{017808B4-D521-3945-B0F8-A2E44469D97F}" type="datetimeFigureOut">
               <a:rPr kumimoji="1" lang="ko-KR" altLang="en-US" smtClean="0"/>
-              <a:t>2024. 3. 19.</a:t>
+              <a:t>2024. 5. 29.</a:t>
             </a:fld>
             <a:endParaRPr kumimoji="1" lang="ko-KR" altLang="en-US"/>
           </a:p>
@@ -1403,7 +1403,7 @@
           <a:p>
             <a:fld id="{017808B4-D521-3945-B0F8-A2E44469D97F}" type="datetimeFigureOut">
               <a:rPr kumimoji="1" lang="ko-KR" altLang="en-US" smtClean="0"/>
-              <a:t>2024. 3. 19.</a:t>
+              <a:t>2024. 5. 29.</a:t>
             </a:fld>
             <a:endParaRPr kumimoji="1" lang="ko-KR" altLang="en-US"/>
           </a:p>
@@ -1815,7 +1815,7 @@
           <a:p>
             <a:fld id="{017808B4-D521-3945-B0F8-A2E44469D97F}" type="datetimeFigureOut">
               <a:rPr kumimoji="1" lang="ko-KR" altLang="en-US" smtClean="0"/>
-              <a:t>2024. 3. 19.</a:t>
+              <a:t>2024. 5. 29.</a:t>
             </a:fld>
             <a:endParaRPr kumimoji="1" lang="ko-KR" altLang="en-US"/>
           </a:p>
@@ -1956,7 +1956,7 @@
           <a:p>
             <a:fld id="{017808B4-D521-3945-B0F8-A2E44469D97F}" type="datetimeFigureOut">
               <a:rPr kumimoji="1" lang="ko-KR" altLang="en-US" smtClean="0"/>
-              <a:t>2024. 3. 19.</a:t>
+              <a:t>2024. 5. 29.</a:t>
             </a:fld>
             <a:endParaRPr kumimoji="1" lang="ko-KR" altLang="en-US"/>
           </a:p>
@@ -2069,7 +2069,7 @@
           <a:p>
             <a:fld id="{017808B4-D521-3945-B0F8-A2E44469D97F}" type="datetimeFigureOut">
               <a:rPr kumimoji="1" lang="ko-KR" altLang="en-US" smtClean="0"/>
-              <a:t>2024. 3. 19.</a:t>
+              <a:t>2024. 5. 29.</a:t>
             </a:fld>
             <a:endParaRPr kumimoji="1" lang="ko-KR" altLang="en-US"/>
           </a:p>
@@ -2380,7 +2380,7 @@
           <a:p>
             <a:fld id="{017808B4-D521-3945-B0F8-A2E44469D97F}" type="datetimeFigureOut">
               <a:rPr kumimoji="1" lang="ko-KR" altLang="en-US" smtClean="0"/>
-              <a:t>2024. 3. 19.</a:t>
+              <a:t>2024. 5. 29.</a:t>
             </a:fld>
             <a:endParaRPr kumimoji="1" lang="ko-KR" altLang="en-US"/>
           </a:p>
@@ -2668,7 +2668,7 @@
           <a:p>
             <a:fld id="{017808B4-D521-3945-B0F8-A2E44469D97F}" type="datetimeFigureOut">
               <a:rPr kumimoji="1" lang="ko-KR" altLang="en-US" smtClean="0"/>
-              <a:t>2024. 3. 19.</a:t>
+              <a:t>2024. 5. 29.</a:t>
             </a:fld>
             <a:endParaRPr kumimoji="1" lang="ko-KR" altLang="en-US"/>
           </a:p>
@@ -2909,7 +2909,7 @@
           <a:p>
             <a:fld id="{017808B4-D521-3945-B0F8-A2E44469D97F}" type="datetimeFigureOut">
               <a:rPr kumimoji="1" lang="ko-KR" altLang="en-US" smtClean="0"/>
-              <a:t>2024. 3. 19.</a:t>
+              <a:t>2024. 5. 29.</a:t>
             </a:fld>
             <a:endParaRPr kumimoji="1" lang="ko-KR" altLang="en-US"/>
           </a:p>
@@ -3355,7 +3355,7 @@
         </p:blipFill>
         <p:spPr bwMode="auto">
           <a:xfrm>
-            <a:off x="229091" y="3429000"/>
+            <a:off x="387826" y="2827400"/>
             <a:ext cx="1549604" cy="867778"/>
           </a:xfrm>
           <a:prstGeom prst="rect">
@@ -3763,8 +3763,8 @@
         </p:nvCxnSpPr>
         <p:spPr>
           <a:xfrm>
-            <a:off x="1956148" y="3917124"/>
-            <a:ext cx="1413353" cy="0"/>
+            <a:off x="2102770" y="3391050"/>
+            <a:ext cx="1306549" cy="403690"/>
           </a:xfrm>
           <a:prstGeom prst="straightConnector1">
             <a:avLst/>
@@ -3806,9 +3806,9 @@
           <p:nvPr/>
         </p:nvCxnSpPr>
         <p:spPr>
-          <a:xfrm flipH="1">
-            <a:off x="1956148" y="4396340"/>
-            <a:ext cx="1383081" cy="0"/>
+          <a:xfrm flipH="1" flipV="1">
+            <a:off x="1951379" y="3794740"/>
+            <a:ext cx="1306549" cy="403690"/>
           </a:xfrm>
           <a:prstGeom prst="straightConnector1">
             <a:avLst/>
@@ -3885,7 +3885,7 @@
         </p:nvSpPr>
         <p:spPr>
           <a:xfrm>
-            <a:off x="229091" y="4458346"/>
+            <a:off x="393882" y="3856746"/>
             <a:ext cx="1549604" cy="646331"/>
           </a:xfrm>
           <a:prstGeom prst="rect">
@@ -4106,6 +4106,185 @@
           <a:xfrm flipH="1" flipV="1">
             <a:off x="2077511" y="1474284"/>
             <a:ext cx="2059611" cy="2181799"/>
+          </a:xfrm>
+          <a:prstGeom prst="straightConnector1">
+            <a:avLst/>
+          </a:prstGeom>
+          <a:ln w="25400">
+            <a:solidFill>
+              <a:schemeClr val="tx1"/>
+            </a:solidFill>
+            <a:tailEnd type="triangle"/>
+          </a:ln>
+        </p:spPr>
+        <p:style>
+          <a:lnRef idx="2">
+            <a:schemeClr val="accent1"/>
+          </a:lnRef>
+          <a:fillRef idx="0">
+            <a:schemeClr val="accent1"/>
+          </a:fillRef>
+          <a:effectRef idx="1">
+            <a:schemeClr val="accent1"/>
+          </a:effectRef>
+          <a:fontRef idx="minor">
+            <a:schemeClr val="tx1"/>
+          </a:fontRef>
+        </p:style>
+      </p:cxnSp>
+      <p:pic>
+        <p:nvPicPr>
+          <p:cNvPr id="24" name="Picture 2" descr="크롬 인터넷 창까지 빼가는 엣지, 무슨 일? | 테크플러스">
+            <a:extLst>
+              <a:ext uri="{FF2B5EF4-FFF2-40B4-BE49-F238E27FC236}">
+                <a16:creationId xmlns:a16="http://schemas.microsoft.com/office/drawing/2014/main" id="{F5FF4203-D5EB-BA64-06BB-69C2C1B59001}"/>
+              </a:ext>
+            </a:extLst>
+          </p:cNvPr>
+          <p:cNvPicPr>
+            <a:picLocks noChangeAspect="1" noChangeArrowheads="1"/>
+          </p:cNvPicPr>
+          <p:nvPr/>
+        </p:nvPicPr>
+        <p:blipFill>
+          <a:blip r:embed="rId9">
+            <a:extLst>
+              <a:ext uri="{28A0092B-C50C-407E-A947-70E740481C1C}">
+                <a14:useLocalDpi xmlns:a14="http://schemas.microsoft.com/office/drawing/2010/main" val="0"/>
+              </a:ext>
+            </a:extLst>
+          </a:blip>
+          <a:srcRect/>
+          <a:stretch>
+            <a:fillRect/>
+          </a:stretch>
+        </p:blipFill>
+        <p:spPr bwMode="auto">
+          <a:xfrm>
+            <a:off x="139019" y="4673494"/>
+            <a:ext cx="2008396" cy="1004198"/>
+          </a:xfrm>
+          <a:prstGeom prst="rect">
+            <a:avLst/>
+          </a:prstGeom>
+          <a:noFill/>
+          <a:extLst>
+            <a:ext uri="{909E8E84-426E-40DD-AFC4-6F175D3DCCD1}">
+              <a14:hiddenFill xmlns:a14="http://schemas.microsoft.com/office/drawing/2010/main">
+                <a:solidFill>
+                  <a:srgbClr val="FFFFFF"/>
+                </a:solidFill>
+              </a14:hiddenFill>
+            </a:ext>
+          </a:extLst>
+        </p:spPr>
+      </p:pic>
+      <p:sp>
+        <p:nvSpPr>
+          <p:cNvPr id="25" name="TextBox 24">
+            <a:extLst>
+              <a:ext uri="{FF2B5EF4-FFF2-40B4-BE49-F238E27FC236}">
+                <a16:creationId xmlns:a16="http://schemas.microsoft.com/office/drawing/2014/main" id="{0DA306F4-C575-21AA-D8DF-75600C7614C8}"/>
+              </a:ext>
+            </a:extLst>
+          </p:cNvPr>
+          <p:cNvSpPr txBox="1"/>
+          <p:nvPr/>
+        </p:nvSpPr>
+        <p:spPr>
+          <a:xfrm>
+            <a:off x="282869" y="5556066"/>
+            <a:ext cx="1794642" cy="646331"/>
+          </a:xfrm>
+          <a:prstGeom prst="rect">
+            <a:avLst/>
+          </a:prstGeom>
+          <a:noFill/>
+        </p:spPr>
+        <p:txBody>
+          <a:bodyPr wrap="square" rtlCol="0">
+            <a:spAutoFit/>
+          </a:bodyPr>
+          <a:lstStyle/>
+          <a:p>
+            <a:pPr algn="ctr"/>
+            <a:r>
+              <a:rPr kumimoji="1" lang="en-US" altLang="ko-KR" dirty="0"/>
+              <a:t>Web</a:t>
+            </a:r>
+          </a:p>
+          <a:p>
+            <a:pPr algn="ctr"/>
+            <a:r>
+              <a:rPr kumimoji="1" lang="en-US" altLang="ko-KR" dirty="0"/>
+              <a:t>(HTML, CSS, JS)</a:t>
+            </a:r>
+            <a:endParaRPr kumimoji="1" lang="ko-KR" altLang="en-US" dirty="0"/>
+          </a:p>
+        </p:txBody>
+      </p:sp>
+      <p:cxnSp>
+        <p:nvCxnSpPr>
+          <p:cNvPr id="27" name="직선 화살표 연결선 26">
+            <a:extLst>
+              <a:ext uri="{FF2B5EF4-FFF2-40B4-BE49-F238E27FC236}">
+                <a16:creationId xmlns:a16="http://schemas.microsoft.com/office/drawing/2014/main" id="{D82E7421-345A-F6D1-E818-22E15A46B46C}"/>
+              </a:ext>
+            </a:extLst>
+          </p:cNvPr>
+          <p:cNvCxnSpPr>
+            <a:cxnSpLocks/>
+          </p:cNvCxnSpPr>
+          <p:nvPr/>
+        </p:nvCxnSpPr>
+        <p:spPr>
+          <a:xfrm flipV="1">
+            <a:off x="2102770" y="4428142"/>
+            <a:ext cx="1227826" cy="467380"/>
+          </a:xfrm>
+          <a:prstGeom prst="straightConnector1">
+            <a:avLst/>
+          </a:prstGeom>
+          <a:ln w="25400">
+            <a:solidFill>
+              <a:schemeClr val="tx1"/>
+            </a:solidFill>
+            <a:tailEnd type="triangle"/>
+          </a:ln>
+        </p:spPr>
+        <p:style>
+          <a:lnRef idx="2">
+            <a:schemeClr val="accent1"/>
+          </a:lnRef>
+          <a:fillRef idx="0">
+            <a:schemeClr val="accent1"/>
+          </a:fillRef>
+          <a:effectRef idx="1">
+            <a:schemeClr val="accent1"/>
+          </a:effectRef>
+          <a:fontRef idx="minor">
+            <a:schemeClr val="tx1"/>
+          </a:fontRef>
+        </p:style>
+      </p:cxnSp>
+      <p:cxnSp>
+        <p:nvCxnSpPr>
+          <p:cNvPr id="28" name="직선 화살표 연결선 27">
+            <a:extLst>
+              <a:ext uri="{FF2B5EF4-FFF2-40B4-BE49-F238E27FC236}">
+                <a16:creationId xmlns:a16="http://schemas.microsoft.com/office/drawing/2014/main" id="{A7919B92-795E-A800-5830-FB5D44EA8474}"/>
+              </a:ext>
+            </a:extLst>
+          </p:cNvPr>
+          <p:cNvCxnSpPr>
+            <a:cxnSpLocks/>
+          </p:cNvCxnSpPr>
+          <p:nvPr/>
+        </p:nvCxnSpPr>
+        <p:spPr>
+          <a:xfrm flipH="1">
+            <a:off x="2176736" y="4770397"/>
+            <a:ext cx="1261904" cy="480054"/>
           </a:xfrm>
           <a:prstGeom prst="straightConnector1">
             <a:avLst/>

</xml_diff>